<commit_message>
modified parameters and PPT
</commit_message>
<xml_diff>
--- a/RolandJiang.pptx
+++ b/RolandJiang.pptx
@@ -5,16 +5,18 @@
     <p:sldMasterId id="2147483649" r:id="rId1"/>
   </p:sldMasterIdLst>
   <p:notesMasterIdLst>
-    <p:notesMasterId r:id="rId9"/>
+    <p:notesMasterId r:id="rId11"/>
   </p:notesMasterIdLst>
   <p:sldIdLst>
     <p:sldId id="256" r:id="rId2"/>
     <p:sldId id="257" r:id="rId3"/>
     <p:sldId id="259" r:id="rId4"/>
-    <p:sldId id="258" r:id="rId5"/>
-    <p:sldId id="260" r:id="rId6"/>
-    <p:sldId id="261" r:id="rId7"/>
-    <p:sldId id="262" r:id="rId8"/>
+    <p:sldId id="263" r:id="rId5"/>
+    <p:sldId id="264" r:id="rId6"/>
+    <p:sldId id="258" r:id="rId7"/>
+    <p:sldId id="260" r:id="rId8"/>
+    <p:sldId id="261" r:id="rId9"/>
+    <p:sldId id="262" r:id="rId10"/>
   </p:sldIdLst>
   <p:sldSz cx="9144000" cy="6858000" type="screen4x3"/>
   <p:notesSz cx="7099300" cy="10234613"/>
@@ -736,7 +738,7 @@
               <a:pPr>
                 <a:defRPr/>
               </a:pPr>
-              <a:t>4</a:t>
+              <a:t>6</a:t>
             </a:fld>
             <a:endParaRPr lang="en-US" altLang="zh-TW"/>
           </a:p>
@@ -6476,7 +6478,7 @@
           <a:p>
             <a:r>
               <a:rPr lang="en-US" altLang="zh-TW" dirty="0"/>
-              <a:t>Naive Thought</a:t>
+              <a:t>IDEAS</a:t>
             </a:r>
             <a:endParaRPr lang="zh-TW" altLang="en-US" dirty="0"/>
           </a:p>
@@ -6498,33 +6500,39 @@
             <p:ph idx="1"/>
           </p:nvPr>
         </p:nvSpPr>
-        <p:spPr>
-          <a:xfrm>
-            <a:off x="1794520" y="2124668"/>
-            <a:ext cx="1378496" cy="1009674"/>
-          </a:xfrm>
-        </p:spPr>
+        <p:spPr/>
         <p:txBody>
           <a:bodyPr/>
           <a:lstStyle/>
           <a:p>
-            <a:pPr marL="0" indent="0" algn="ctr">
-              <a:buNone/>
-            </a:pPr>
             <a:r>
               <a:rPr lang="en-US" altLang="zh-TW" dirty="0"/>
-              <a:t>ABC</a:t>
-            </a:r>
-          </a:p>
-          <a:p>
-            <a:pPr marL="0" indent="0" algn="ctr">
-              <a:buNone/>
-            </a:pPr>
+              <a:t>Logic Synthesis -&gt; ABC + SA</a:t>
+            </a:r>
+          </a:p>
+          <a:p>
+            <a:pPr lvl="1"/>
             <a:r>
               <a:rPr lang="en-US" altLang="zh-TW" dirty="0"/>
-              <a:t>SA</a:t>
-            </a:r>
-            <a:endParaRPr lang="zh-TW" altLang="en-US" dirty="0"/>
+              <a:t>Neighborhood : ABC Commands</a:t>
+            </a:r>
+          </a:p>
+          <a:p>
+            <a:pPr lvl="1"/>
+            <a:r>
+              <a:rPr lang="en-US" altLang="zh-TW" dirty="0"/>
+              <a:t>Step : Randomly pick a command to execute, then output the netlist after the execution of the command. Give a heuristic assignment of gate #, then compute Cost(netlist)</a:t>
+            </a:r>
+          </a:p>
+          <a:p>
+            <a:pPr lvl="1"/>
+            <a:r>
+              <a:rPr lang="en-US" altLang="zh-TW" dirty="0"/>
+              <a:t>Cost : From the given cost estimators</a:t>
+            </a:r>
+          </a:p>
+          <a:p>
+            <a:endParaRPr lang="en-US" altLang="zh-TW" dirty="0"/>
           </a:p>
         </p:txBody>
       </p:sp>
@@ -6558,6 +6566,290 @@
                 <a:defRPr/>
               </a:pPr>
               <a:t>4</a:t>
+            </a:fld>
+            <a:endParaRPr lang="en-US" altLang="zh-TW"/>
+          </a:p>
+        </p:txBody>
+      </p:sp>
+    </p:spTree>
+    <p:extLst>
+      <p:ext uri="{BB962C8B-B14F-4D97-AF65-F5344CB8AC3E}">
+        <p14:creationId xmlns:p14="http://schemas.microsoft.com/office/powerpoint/2010/main" val="2657542943"/>
+      </p:ext>
+    </p:extLst>
+  </p:cSld>
+  <p:clrMapOvr>
+    <a:masterClrMapping/>
+  </p:clrMapOvr>
+</p:sld>
+</file>
+
+<file path=ppt/slides/slide5.xml><?xml version="1.0" encoding="utf-8"?>
+<p:sld xmlns:a="http://schemas.openxmlformats.org/drawingml/2006/main" xmlns:r="http://schemas.openxmlformats.org/officeDocument/2006/relationships" xmlns:p="http://schemas.openxmlformats.org/presentationml/2006/main">
+  <p:cSld>
+    <p:spTree>
+      <p:nvGrpSpPr>
+        <p:cNvPr id="1" name=""/>
+        <p:cNvGrpSpPr/>
+        <p:nvPr/>
+      </p:nvGrpSpPr>
+      <p:grpSpPr>
+        <a:xfrm>
+          <a:off x="0" y="0"/>
+          <a:ext cx="0" cy="0"/>
+          <a:chOff x="0" y="0"/>
+          <a:chExt cx="0" cy="0"/>
+        </a:xfrm>
+      </p:grpSpPr>
+      <p:sp>
+        <p:nvSpPr>
+          <p:cNvPr id="2" name="標題 1">
+            <a:extLst>
+              <a:ext uri="{FF2B5EF4-FFF2-40B4-BE49-F238E27FC236}">
+                <a16:creationId xmlns:a16="http://schemas.microsoft.com/office/drawing/2014/main" id="{442A927F-92B0-E5E5-F227-F3EC15CE917E}"/>
+              </a:ext>
+            </a:extLst>
+          </p:cNvPr>
+          <p:cNvSpPr>
+            <a:spLocks noGrp="1"/>
+          </p:cNvSpPr>
+          <p:nvPr>
+            <p:ph type="title"/>
+          </p:nvPr>
+        </p:nvSpPr>
+        <p:spPr/>
+        <p:txBody>
+          <a:bodyPr/>
+          <a:lstStyle/>
+          <a:p>
+            <a:r>
+              <a:rPr lang="en-US" altLang="zh-TW" dirty="0"/>
+              <a:t>IDEAS</a:t>
+            </a:r>
+            <a:endParaRPr lang="zh-TW" altLang="en-US" dirty="0"/>
+          </a:p>
+        </p:txBody>
+      </p:sp>
+      <p:sp>
+        <p:nvSpPr>
+          <p:cNvPr id="3" name="內容版面配置區 2">
+            <a:extLst>
+              <a:ext uri="{FF2B5EF4-FFF2-40B4-BE49-F238E27FC236}">
+                <a16:creationId xmlns:a16="http://schemas.microsoft.com/office/drawing/2014/main" id="{7447DF35-E949-4F5D-8FB5-18A310E4BB06}"/>
+              </a:ext>
+            </a:extLst>
+          </p:cNvPr>
+          <p:cNvSpPr>
+            <a:spLocks noGrp="1"/>
+          </p:cNvSpPr>
+          <p:nvPr>
+            <p:ph idx="1"/>
+          </p:nvPr>
+        </p:nvSpPr>
+        <p:spPr/>
+        <p:txBody>
+          <a:bodyPr/>
+          <a:lstStyle/>
+          <a:p>
+            <a:r>
+              <a:rPr lang="en-US" altLang="zh-TW" dirty="0"/>
+              <a:t>Technology Mapping -&gt; SA</a:t>
+            </a:r>
+          </a:p>
+          <a:p>
+            <a:pPr lvl="1"/>
+            <a:r>
+              <a:rPr lang="en-US" altLang="zh-TW" dirty="0"/>
+              <a:t>Neighborhood : Different gate #</a:t>
+            </a:r>
+          </a:p>
+          <a:p>
+            <a:pPr lvl="1"/>
+            <a:r>
+              <a:rPr lang="en-US" altLang="zh-TW" dirty="0"/>
+              <a:t>Step : Move to other neighborhood with distance is proportional to current temperature</a:t>
+            </a:r>
+          </a:p>
+          <a:p>
+            <a:pPr lvl="1"/>
+            <a:r>
+              <a:rPr lang="en-US" altLang="zh-TW" dirty="0"/>
+              <a:t>Cost : From the given cost estimators</a:t>
+            </a:r>
+            <a:endParaRPr lang="zh-TW" altLang="en-US" dirty="0"/>
+          </a:p>
+        </p:txBody>
+      </p:sp>
+      <p:sp>
+        <p:nvSpPr>
+          <p:cNvPr id="4" name="投影片編號版面配置區 3">
+            <a:extLst>
+              <a:ext uri="{FF2B5EF4-FFF2-40B4-BE49-F238E27FC236}">
+                <a16:creationId xmlns:a16="http://schemas.microsoft.com/office/drawing/2014/main" id="{B15D0ABC-0C0F-79C2-DBDF-649A7D01CC8E}"/>
+              </a:ext>
+            </a:extLst>
+          </p:cNvPr>
+          <p:cNvSpPr>
+            <a:spLocks noGrp="1"/>
+          </p:cNvSpPr>
+          <p:nvPr>
+            <p:ph type="sldNum" sz="quarter" idx="12"/>
+          </p:nvPr>
+        </p:nvSpPr>
+        <p:spPr/>
+        <p:txBody>
+          <a:bodyPr/>
+          <a:lstStyle/>
+          <a:p>
+            <a:pPr>
+              <a:defRPr/>
+            </a:pPr>
+            <a:fld id="{8F5F56E1-31C3-4936-AC76-6E9C056A1F24}" type="slidenum">
+              <a:rPr lang="en-US" altLang="zh-TW" smtClean="0"/>
+              <a:pPr>
+                <a:defRPr/>
+              </a:pPr>
+              <a:t>5</a:t>
+            </a:fld>
+            <a:endParaRPr lang="en-US" altLang="zh-TW"/>
+          </a:p>
+        </p:txBody>
+      </p:sp>
+    </p:spTree>
+    <p:extLst>
+      <p:ext uri="{BB962C8B-B14F-4D97-AF65-F5344CB8AC3E}">
+        <p14:creationId xmlns:p14="http://schemas.microsoft.com/office/powerpoint/2010/main" val="1726299754"/>
+      </p:ext>
+    </p:extLst>
+  </p:cSld>
+  <p:clrMapOvr>
+    <a:masterClrMapping/>
+  </p:clrMapOvr>
+</p:sld>
+</file>
+
+<file path=ppt/slides/slide6.xml><?xml version="1.0" encoding="utf-8"?>
+<p:sld xmlns:a="http://schemas.openxmlformats.org/drawingml/2006/main" xmlns:r="http://schemas.openxmlformats.org/officeDocument/2006/relationships" xmlns:p="http://schemas.openxmlformats.org/presentationml/2006/main">
+  <p:cSld>
+    <p:spTree>
+      <p:nvGrpSpPr>
+        <p:cNvPr id="1" name=""/>
+        <p:cNvGrpSpPr/>
+        <p:nvPr/>
+      </p:nvGrpSpPr>
+      <p:grpSpPr>
+        <a:xfrm>
+          <a:off x="0" y="0"/>
+          <a:ext cx="0" cy="0"/>
+          <a:chOff x="0" y="0"/>
+          <a:chExt cx="0" cy="0"/>
+        </a:xfrm>
+      </p:grpSpPr>
+      <p:sp>
+        <p:nvSpPr>
+          <p:cNvPr id="2" name="標題 1">
+            <a:extLst>
+              <a:ext uri="{FF2B5EF4-FFF2-40B4-BE49-F238E27FC236}">
+                <a16:creationId xmlns:a16="http://schemas.microsoft.com/office/drawing/2014/main" id="{442A927F-92B0-E5E5-F227-F3EC15CE917E}"/>
+              </a:ext>
+            </a:extLst>
+          </p:cNvPr>
+          <p:cNvSpPr>
+            <a:spLocks noGrp="1"/>
+          </p:cNvSpPr>
+          <p:nvPr>
+            <p:ph type="title"/>
+          </p:nvPr>
+        </p:nvSpPr>
+        <p:spPr/>
+        <p:txBody>
+          <a:bodyPr/>
+          <a:lstStyle/>
+          <a:p>
+            <a:r>
+              <a:rPr lang="en-US" altLang="zh-TW" dirty="0"/>
+              <a:t>Naive Thought</a:t>
+            </a:r>
+            <a:endParaRPr lang="zh-TW" altLang="en-US" dirty="0"/>
+          </a:p>
+        </p:txBody>
+      </p:sp>
+      <p:sp>
+        <p:nvSpPr>
+          <p:cNvPr id="3" name="內容版面配置區 2">
+            <a:extLst>
+              <a:ext uri="{FF2B5EF4-FFF2-40B4-BE49-F238E27FC236}">
+                <a16:creationId xmlns:a16="http://schemas.microsoft.com/office/drawing/2014/main" id="{7447DF35-E949-4F5D-8FB5-18A310E4BB06}"/>
+              </a:ext>
+            </a:extLst>
+          </p:cNvPr>
+          <p:cNvSpPr>
+            <a:spLocks noGrp="1"/>
+          </p:cNvSpPr>
+          <p:nvPr>
+            <p:ph idx="1"/>
+          </p:nvPr>
+        </p:nvSpPr>
+        <p:spPr>
+          <a:xfrm>
+            <a:off x="1794520" y="2124668"/>
+            <a:ext cx="1378496" cy="1009674"/>
+          </a:xfrm>
+        </p:spPr>
+        <p:txBody>
+          <a:bodyPr/>
+          <a:lstStyle/>
+          <a:p>
+            <a:pPr marL="0" indent="0" algn="ctr">
+              <a:buNone/>
+            </a:pPr>
+            <a:r>
+              <a:rPr lang="en-US" altLang="zh-TW" dirty="0"/>
+              <a:t>ABC</a:t>
+            </a:r>
+          </a:p>
+          <a:p>
+            <a:pPr marL="0" indent="0" algn="ctr">
+              <a:buNone/>
+            </a:pPr>
+            <a:r>
+              <a:rPr lang="en-US" altLang="zh-TW" dirty="0"/>
+              <a:t>SA</a:t>
+            </a:r>
+            <a:endParaRPr lang="zh-TW" altLang="en-US" dirty="0"/>
+          </a:p>
+        </p:txBody>
+      </p:sp>
+      <p:sp>
+        <p:nvSpPr>
+          <p:cNvPr id="4" name="投影片編號版面配置區 3">
+            <a:extLst>
+              <a:ext uri="{FF2B5EF4-FFF2-40B4-BE49-F238E27FC236}">
+                <a16:creationId xmlns:a16="http://schemas.microsoft.com/office/drawing/2014/main" id="{B15D0ABC-0C0F-79C2-DBDF-649A7D01CC8E}"/>
+              </a:ext>
+            </a:extLst>
+          </p:cNvPr>
+          <p:cNvSpPr>
+            <a:spLocks noGrp="1"/>
+          </p:cNvSpPr>
+          <p:nvPr>
+            <p:ph type="sldNum" sz="quarter" idx="12"/>
+          </p:nvPr>
+        </p:nvSpPr>
+        <p:spPr/>
+        <p:txBody>
+          <a:bodyPr/>
+          <a:lstStyle/>
+          <a:p>
+            <a:pPr>
+              <a:defRPr/>
+            </a:pPr>
+            <a:fld id="{8F5F56E1-31C3-4936-AC76-6E9C056A1F24}" type="slidenum">
+              <a:rPr lang="en-US" altLang="zh-TW" smtClean="0"/>
+              <a:pPr>
+                <a:defRPr/>
+              </a:pPr>
+              <a:t>6</a:t>
             </a:fld>
             <a:endParaRPr lang="en-US" altLang="zh-TW"/>
           </a:p>
@@ -8436,7 +8728,7 @@
 </p:sld>
 </file>
 
-<file path=ppt/slides/slide5.xml><?xml version="1.0" encoding="utf-8"?>
+<file path=ppt/slides/slide7.xml><?xml version="1.0" encoding="utf-8"?>
 <p:sld xmlns:a="http://schemas.openxmlformats.org/drawingml/2006/main" xmlns:r="http://schemas.openxmlformats.org/officeDocument/2006/relationships" xmlns:p="http://schemas.openxmlformats.org/presentationml/2006/main">
   <p:cSld>
     <p:spTree>
@@ -8557,7 +8849,7 @@
               <a:pPr>
                 <a:defRPr/>
               </a:pPr>
-              <a:t>5</a:t>
+              <a:t>7</a:t>
             </a:fld>
             <a:endParaRPr lang="en-US" altLang="zh-TW"/>
           </a:p>
@@ -10416,7 +10708,7 @@
 </p:sld>
 </file>
 
-<file path=ppt/slides/slide6.xml><?xml version="1.0" encoding="utf-8"?>
+<file path=ppt/slides/slide8.xml><?xml version="1.0" encoding="utf-8"?>
 <p:sld xmlns:a="http://schemas.openxmlformats.org/drawingml/2006/main" xmlns:r="http://schemas.openxmlformats.org/officeDocument/2006/relationships" xmlns:p="http://schemas.openxmlformats.org/presentationml/2006/main">
   <p:cSld>
     <p:spTree>
@@ -10520,7 +10812,7 @@
               <a:pPr>
                 <a:defRPr/>
               </a:pPr>
-              <a:t>6</a:t>
+              <a:t>8</a:t>
             </a:fld>
             <a:endParaRPr lang="en-US" altLang="zh-TW"/>
           </a:p>
@@ -11754,7 +12046,7 @@
 </p:sld>
 </file>
 
-<file path=ppt/slides/slide7.xml><?xml version="1.0" encoding="utf-8"?>
+<file path=ppt/slides/slide9.xml><?xml version="1.0" encoding="utf-8"?>
 <p:sld xmlns:a="http://schemas.openxmlformats.org/drawingml/2006/main" xmlns:r="http://schemas.openxmlformats.org/officeDocument/2006/relationships" xmlns:p="http://schemas.openxmlformats.org/presentationml/2006/main">
   <p:cSld>
     <p:spTree>
@@ -11829,7 +12121,7 @@
               <a:pPr>
                 <a:defRPr/>
               </a:pPr>
-              <a:t>7</a:t>
+              <a:t>9</a:t>
             </a:fld>
             <a:endParaRPr lang="en-US" altLang="zh-TW"/>
           </a:p>
@@ -11856,7 +12148,7 @@
           <a:bodyPr/>
           <a:lstStyle/>
           <a:p>
-            <a:endParaRPr lang="zh-TW" altLang="en-US"/>
+            <a:endParaRPr lang="zh-TW" altLang="en-US" dirty="0"/>
           </a:p>
         </p:txBody>
       </p:sp>

</xml_diff>

<commit_message>
finish greddy 1 and 3 gates
</commit_message>
<xml_diff>
--- a/RolandJiang.pptx
+++ b/RolandJiang.pptx
@@ -5360,7 +5360,7 @@
           <a:p>
             <a:r>
               <a:rPr lang="en-US" altLang="zh-TW" dirty="0"/>
-              <a:t>Not Decided Yet</a:t>
+              <a:t>Annealed Annealing</a:t>
             </a:r>
             <a:endParaRPr lang="zh-TW" altLang="en-US" dirty="0"/>
           </a:p>
@@ -5389,22 +5389,35 @@
           <a:p>
             <a:r>
               <a:rPr lang="en-US" altLang="zh-TW" dirty="0"/>
-              <a:t>B11901015</a:t>
+              <a:t>B11901015 </a:t>
+            </a:r>
+            <a:r>
+              <a:rPr lang="zh-TW" altLang="en-US" dirty="0"/>
+              <a:t>黃思維</a:t>
             </a:r>
             <a:br>
               <a:rPr lang="en-US" altLang="zh-TW" dirty="0"/>
             </a:br>
             <a:r>
               <a:rPr lang="en-US" altLang="zh-TW" dirty="0"/>
-              <a:t>B11901020</a:t>
+              <a:t>B11901020 </a:t>
+            </a:r>
+            <a:r>
+              <a:rPr lang="zh-TW" altLang="en-US" dirty="0"/>
+              <a:t>鄭博元</a:t>
             </a:r>
             <a:br>
               <a:rPr lang="en-US" altLang="zh-TW" dirty="0"/>
             </a:br>
             <a:r>
               <a:rPr lang="en-US" altLang="zh-TW" dirty="0"/>
-              <a:t>B11901027</a:t>
+              <a:t>B11901027 </a:t>
             </a:r>
+            <a:r>
+              <a:rPr lang="zh-TW" altLang="en-US" dirty="0"/>
+              <a:t>王仁軒</a:t>
+            </a:r>
+            <a:endParaRPr lang="en-US" altLang="zh-TW" dirty="0"/>
           </a:p>
         </p:txBody>
       </p:sp>

</xml_diff>